<commit_message>
Finish v1 of powerpoint template
Includes accessibility fixes to template (alt text, reading order,
colour contrast).
</commit_message>
<xml_diff>
--- a/branding/templates/widescreen-template.pptx
+++ b/branding/templates/widescreen-template.pptx
@@ -5,24 +5,19 @@
     <p:sldMasterId id="2147483648" r:id="rId1"/>
   </p:sldMasterIdLst>
   <p:notesMasterIdLst>
-    <p:notesMasterId r:id="rId9"/>
+    <p:notesMasterId r:id="rId4"/>
   </p:notesMasterIdLst>
   <p:handoutMasterIdLst>
-    <p:handoutMasterId r:id="rId10"/>
+    <p:handoutMasterId r:id="rId5"/>
   </p:handoutMasterIdLst>
   <p:sldIdLst>
-    <p:sldId id="271" r:id="rId2"/>
+    <p:sldId id="256" r:id="rId2"/>
     <p:sldId id="257" r:id="rId3"/>
-    <p:sldId id="267" r:id="rId4"/>
-    <p:sldId id="266" r:id="rId5"/>
-    <p:sldId id="265" r:id="rId6"/>
-    <p:sldId id="270" r:id="rId7"/>
-    <p:sldId id="269" r:id="rId8"/>
   </p:sldIdLst>
   <p:sldSz cx="12192000" cy="6858000"/>
   <p:notesSz cx="6858000" cy="9144000"/>
   <p:custDataLst>
-    <p:tags r:id="rId11"/>
+    <p:tags r:id="rId6"/>
   </p:custDataLst>
   <p:defaultTextStyle>
     <a:defPPr>
@@ -212,7 +207,7 @@
           <a:p>
             <a:fld id="{C432A8CA-5653-4CB8-AEEB-44430BC38506}" type="datetimeFigureOut">
               <a:rPr lang="en-CA" smtClean="0"/>
-              <a:t>2019-09-09</a:t>
+              <a:t>2019-09-10</a:t>
             </a:fld>
             <a:endParaRPr lang="en-CA"/>
           </a:p>
@@ -377,7 +372,7 @@
           <a:p>
             <a:fld id="{F54FB522-10CE-4B3C-92A1-9B8FCA0AFF13}" type="datetimeFigureOut">
               <a:rPr lang="en-CA" smtClean="0"/>
-              <a:t>2019-09-09</a:t>
+              <a:t>2019-09-10</a:t>
             </a:fld>
             <a:endParaRPr lang="en-CA"/>
           </a:p>
@@ -645,90 +640,6 @@
 </p:notesMaster>
 </file>
 
-<file path=ppt/notesSlides/notesSlide1.xml><?xml version="1.0" encoding="utf-8"?>
-<p:notes xmlns:a="http://schemas.openxmlformats.org/drawingml/2006/main" xmlns:r="http://schemas.openxmlformats.org/officeDocument/2006/relationships" xmlns:p="http://schemas.openxmlformats.org/presentationml/2006/main">
-  <p:cSld>
-    <p:spTree>
-      <p:nvGrpSpPr>
-        <p:cNvPr id="1" name=""/>
-        <p:cNvGrpSpPr/>
-        <p:nvPr/>
-      </p:nvGrpSpPr>
-      <p:grpSpPr>
-        <a:xfrm>
-          <a:off x="0" y="0"/>
-          <a:ext cx="0" cy="0"/>
-          <a:chOff x="0" y="0"/>
-          <a:chExt cx="0" cy="0"/>
-        </a:xfrm>
-      </p:grpSpPr>
-      <p:sp>
-        <p:nvSpPr>
-          <p:cNvPr id="2" name="Slide Image Placeholder 1"/>
-          <p:cNvSpPr>
-            <a:spLocks noGrp="1" noRot="1" noChangeAspect="1"/>
-          </p:cNvSpPr>
-          <p:nvPr>
-            <p:ph type="sldImg"/>
-          </p:nvPr>
-        </p:nvSpPr>
-        <p:spPr/>
-      </p:sp>
-      <p:sp>
-        <p:nvSpPr>
-          <p:cNvPr id="3" name="Notes Placeholder 2"/>
-          <p:cNvSpPr>
-            <a:spLocks noGrp="1"/>
-          </p:cNvSpPr>
-          <p:nvPr>
-            <p:ph type="body" idx="1"/>
-          </p:nvPr>
-        </p:nvSpPr>
-        <p:spPr/>
-        <p:txBody>
-          <a:bodyPr/>
-          <a:lstStyle/>
-          <a:p>
-            <a:endParaRPr lang="en-CA" dirty="0"/>
-          </a:p>
-        </p:txBody>
-      </p:sp>
-      <p:sp>
-        <p:nvSpPr>
-          <p:cNvPr id="4" name="Slide Number Placeholder 3"/>
-          <p:cNvSpPr>
-            <a:spLocks noGrp="1"/>
-          </p:cNvSpPr>
-          <p:nvPr>
-            <p:ph type="sldNum" sz="quarter" idx="10"/>
-          </p:nvPr>
-        </p:nvSpPr>
-        <p:spPr/>
-        <p:txBody>
-          <a:bodyPr/>
-          <a:lstStyle/>
-          <a:p>
-            <a:fld id="{2EE939A7-A6B4-48BA-93BC-D12979265760}" type="slidenum">
-              <a:rPr lang="en-CA" smtClean="0"/>
-              <a:t>2</a:t>
-            </a:fld>
-            <a:endParaRPr lang="en-CA"/>
-          </a:p>
-        </p:txBody>
-      </p:sp>
-    </p:spTree>
-    <p:extLst>
-      <p:ext uri="{BB962C8B-B14F-4D97-AF65-F5344CB8AC3E}">
-        <p14:creationId xmlns:p14="http://schemas.microsoft.com/office/powerpoint/2010/main" val="2960966696"/>
-      </p:ext>
-    </p:extLst>
-  </p:cSld>
-  <p:clrMapOvr>
-    <a:masterClrMapping/>
-  </p:clrMapOvr>
-</p:notes>
-</file>
-
 <file path=ppt/slideLayouts/slideLayout1.xml><?xml version="1.0" encoding="utf-8"?>
 <p:sldLayout xmlns:a="http://schemas.openxmlformats.org/drawingml/2006/main" xmlns:r="http://schemas.openxmlformats.org/officeDocument/2006/relationships" xmlns:p="http://schemas.openxmlformats.org/presentationml/2006/main" type="title" preserve="1">
   <p:cSld name="Title option 1">
@@ -830,7 +741,7 @@
               <a:buNone/>
               <a:defRPr sz="1800">
                 <a:solidFill>
-                  <a:schemeClr val="tx2"/>
+                  <a:srgbClr val="49505A"/>
                 </a:solidFill>
                 <a:latin typeface="Century Gothic" panose="020B0502020202020204" pitchFamily="34" charset="0"/>
               </a:defRPr>
@@ -899,7 +810,7 @@
       </p:sp>
       <p:pic>
         <p:nvPicPr>
-          <p:cNvPr id="6" name="Picture 5"/>
+          <p:cNvPr id="6" name="Picture 5" title="Digital Task Force"/>
           <p:cNvPicPr>
             <a:picLocks noChangeAspect="1"/>
           </p:cNvPicPr>
@@ -929,7 +840,7 @@
       </p:pic>
       <p:pic>
         <p:nvPicPr>
-          <p:cNvPr id="11" name="Picture 10"/>
+          <p:cNvPr id="11" name="Picture 10" title="Shared Services Canada, Governmnet of Canada"/>
           <p:cNvPicPr>
             <a:picLocks noChangeAspect="1"/>
           </p:cNvPicPr>
@@ -1005,7 +916,7 @@
       </p:grpSpPr>
       <p:pic>
         <p:nvPicPr>
-          <p:cNvPr id="4" name="Picture 3"/>
+          <p:cNvPr id="4" name="Picture 3" title="Digital Task Force"/>
           <p:cNvPicPr>
             <a:picLocks noChangeAspect="1"/>
           </p:cNvPicPr>
@@ -1117,7 +1028,7 @@
               <a:buNone/>
               <a:defRPr sz="1800">
                 <a:solidFill>
-                  <a:schemeClr val="tx2"/>
+                  <a:srgbClr val="49505A"/>
                 </a:solidFill>
                 <a:latin typeface="Century Gothic" panose="020B0502020202020204" pitchFamily="34" charset="0"/>
               </a:defRPr>
@@ -1186,7 +1097,7 @@
       </p:sp>
       <p:pic>
         <p:nvPicPr>
-          <p:cNvPr id="7" name="Picture 6"/>
+          <p:cNvPr id="7" name="Picture 6" title="Shared Services Canada, Governmnet of Canada"/>
           <p:cNvPicPr>
             <a:picLocks noChangeAspect="1"/>
           </p:cNvPicPr>
@@ -1344,7 +1255,7 @@
               <a:buNone/>
               <a:defRPr sz="1800">
                 <a:solidFill>
-                  <a:schemeClr val="tx2"/>
+                  <a:srgbClr val="49505A"/>
                 </a:solidFill>
                 <a:latin typeface="Century Gothic" panose="020B0502020202020204" pitchFamily="34" charset="0"/>
               </a:defRPr>
@@ -1413,7 +1324,7 @@
       </p:sp>
       <p:pic>
         <p:nvPicPr>
-          <p:cNvPr id="5" name="Picture 4"/>
+          <p:cNvPr id="5" name="Picture 4" title="Shared Services Canada, Governmnet of Canada"/>
           <p:cNvPicPr>
             <a:picLocks noChangeAspect="1"/>
           </p:cNvPicPr>
@@ -1473,7 +1384,7 @@
       </p:grpSpPr>
       <p:pic>
         <p:nvPicPr>
-          <p:cNvPr id="8" name="Picture 7"/>
+          <p:cNvPr id="8" name="Picture 7" title="Digital Task Force"/>
           <p:cNvPicPr>
             <a:picLocks noChangeAspect="1"/>
           </p:cNvPicPr>
@@ -1534,11 +1445,11 @@
           <a:p>
             <a:r>
               <a:rPr lang="en-US" dirty="0" smtClean="0"/>
-              <a:t>Click to </a:t>
-            </a:r>
-            <a:r>
-              <a:rPr lang="en-US" dirty="0" smtClean="0"/>
-              <a:t>add title</a:t>
+              <a:t>Click to add </a:t>
+            </a:r>
+            <a:r>
+              <a:rPr lang="en-US" dirty="0" smtClean="0"/>
+              <a:t>title</a:t>
             </a:r>
             <a:endParaRPr lang="en-CA" dirty="0"/>
           </a:p>
@@ -1569,7 +1480,7 @@
               <a:buNone/>
               <a:defRPr sz="1800">
                 <a:solidFill>
-                  <a:schemeClr val="tx2"/>
+                  <a:srgbClr val="49505A"/>
                 </a:solidFill>
                 <a:latin typeface="Century Gothic" panose="020B0502020202020204" pitchFamily="34" charset="0"/>
               </a:defRPr>
@@ -1614,7 +1525,7 @@
             </a:r>
             <a:r>
               <a:rPr lang="en-US" dirty="0" smtClean="0"/>
-              <a:t>add</a:t>
+              <a:t>add subtitle</a:t>
             </a:r>
             <a:endParaRPr lang="en-US" dirty="0"/>
           </a:p>
@@ -1622,7 +1533,7 @@
       </p:sp>
       <p:pic>
         <p:nvPicPr>
-          <p:cNvPr id="5" name="Picture 4"/>
+          <p:cNvPr id="5" name="Picture 4" title="Shared Services Canada, Governmnet of Canada"/>
           <p:cNvPicPr>
             <a:picLocks noChangeAspect="1"/>
           </p:cNvPicPr>
@@ -2130,7 +2041,7 @@
       </p:grpSpPr>
       <p:pic>
         <p:nvPicPr>
-          <p:cNvPr id="11" name="Picture 10"/>
+          <p:cNvPr id="4" name="Picture 3"/>
           <p:cNvPicPr>
             <a:picLocks noChangeAspect="1"/>
           </p:cNvPicPr>
@@ -2150,8 +2061,8 @@
         </p:blipFill>
         <p:spPr>
           <a:xfrm>
-            <a:off x="0" y="5981356"/>
-            <a:ext cx="12192000" cy="876644"/>
+            <a:off x="600" y="6071046"/>
+            <a:ext cx="12192000" cy="786954"/>
           </a:xfrm>
           <a:prstGeom prst="rect">
             <a:avLst/>
@@ -2547,12 +2458,15 @@
         </p:nvSpPr>
         <p:spPr>
           <a:xfrm>
-            <a:off x="11643840" y="6419678"/>
-            <a:ext cx="493296" cy="365125"/>
+            <a:off x="11690350" y="6465890"/>
+            <a:ext cx="439738" cy="323850"/>
           </a:xfrm>
           <a:prstGeom prst="rect">
             <a:avLst/>
           </a:prstGeom>
+          <a:solidFill>
+            <a:srgbClr val="631E75"/>
+          </a:solidFill>
         </p:spPr>
         <p:txBody>
           <a:bodyPr vert="horz" lIns="91440" tIns="45720" rIns="91440" bIns="45720" rtlCol="0" anchor="ctr"/>
@@ -2597,7 +2511,6 @@
       </p:par>
     </p:tnLst>
   </p:timing>
-  <p:hf hdr="0" ftr="0" dt="0"/>
 </p:sldLayout>
 </file>
 
@@ -2618,36 +2531,6 @@
           <a:chExt cx="0" cy="0"/>
         </a:xfrm>
       </p:grpSpPr>
-      <p:pic>
-        <p:nvPicPr>
-          <p:cNvPr id="4" name="Picture 3"/>
-          <p:cNvPicPr>
-            <a:picLocks noChangeAspect="1"/>
-          </p:cNvPicPr>
-          <p:nvPr userDrawn="1"/>
-        </p:nvPicPr>
-        <p:blipFill>
-          <a:blip r:embed="rId2" cstate="print">
-            <a:extLst>
-              <a:ext uri="{28A0092B-C50C-407E-A947-70E740481C1C}">
-                <a14:useLocalDpi xmlns:a14="http://schemas.microsoft.com/office/drawing/2010/main" val="0"/>
-              </a:ext>
-            </a:extLst>
-          </a:blip>
-          <a:stretch>
-            <a:fillRect/>
-          </a:stretch>
-        </p:blipFill>
-        <p:spPr>
-          <a:xfrm>
-            <a:off x="600" y="6062366"/>
-            <a:ext cx="12192000" cy="795634"/>
-          </a:xfrm>
-          <a:prstGeom prst="rect">
-            <a:avLst/>
-          </a:prstGeom>
-        </p:spPr>
-      </p:pic>
       <p:sp>
         <p:nvSpPr>
           <p:cNvPr id="2" name="Title 1"/>
@@ -3027,47 +2910,6 @@
       </p:sp>
       <p:sp>
         <p:nvSpPr>
-          <p:cNvPr id="8" name="Slide Number Placeholder 5"/>
-          <p:cNvSpPr>
-            <a:spLocks noGrp="1"/>
-          </p:cNvSpPr>
-          <p:nvPr>
-            <p:ph type="sldNum" sz="quarter" idx="4"/>
-          </p:nvPr>
-        </p:nvSpPr>
-        <p:spPr>
-          <a:xfrm>
-            <a:off x="11287044" y="6261668"/>
-            <a:ext cx="582168" cy="365125"/>
-          </a:xfrm>
-          <a:prstGeom prst="rect">
-            <a:avLst/>
-          </a:prstGeom>
-        </p:spPr>
-        <p:txBody>
-          <a:bodyPr vert="horz" lIns="91440" tIns="45720" rIns="91440" bIns="45720" rtlCol="0" anchor="ctr"/>
-          <a:lstStyle>
-            <a:lvl1pPr algn="r">
-              <a:defRPr sz="1200" b="0">
-                <a:solidFill>
-                  <a:schemeClr val="bg1"/>
-                </a:solidFill>
-                <a:latin typeface="Century Gothic" panose="020B0502020202020204" pitchFamily="34" charset="0"/>
-              </a:defRPr>
-            </a:lvl1pPr>
-          </a:lstStyle>
-          <a:p>
-            <a:fld id="{105822BA-B7AE-4DDB-BAFC-C8E55FB5C986}" type="slidenum">
-              <a:rPr lang="en-CA" smtClean="0"/>
-              <a:pPr/>
-              <a:t>‹#›</a:t>
-            </a:fld>
-            <a:endParaRPr lang="en-CA" dirty="0"/>
-          </a:p>
-        </p:txBody>
-      </p:sp>
-      <p:sp>
-        <p:nvSpPr>
           <p:cNvPr id="28" name="Content Placeholder 27"/>
           <p:cNvSpPr>
             <a:spLocks noGrp="1"/>
@@ -3081,6 +2923,9 @@
             <a:off x="412148" y="6261100"/>
             <a:ext cx="10681335" cy="365125"/>
           </a:xfrm>
+          <a:solidFill>
+            <a:srgbClr val="33333E"/>
+          </a:solidFill>
         </p:spPr>
         <p:txBody>
           <a:bodyPr anchor="ctr">
@@ -3109,6 +2954,80 @@
           </a:p>
         </p:txBody>
       </p:sp>
+      <p:sp>
+        <p:nvSpPr>
+          <p:cNvPr id="8" name="Slide Number Placeholder 5"/>
+          <p:cNvSpPr>
+            <a:spLocks noGrp="1"/>
+          </p:cNvSpPr>
+          <p:nvPr>
+            <p:ph type="sldNum" sz="quarter" idx="4"/>
+          </p:nvPr>
+        </p:nvSpPr>
+        <p:spPr>
+          <a:xfrm>
+            <a:off x="11287044" y="6261668"/>
+            <a:ext cx="582168" cy="365125"/>
+          </a:xfrm>
+          <a:prstGeom prst="rect">
+            <a:avLst/>
+          </a:prstGeom>
+          <a:solidFill>
+            <a:srgbClr val="33333E"/>
+          </a:solidFill>
+        </p:spPr>
+        <p:txBody>
+          <a:bodyPr vert="horz" lIns="91440" tIns="45720" rIns="91440" bIns="45720" rtlCol="0" anchor="ctr"/>
+          <a:lstStyle>
+            <a:lvl1pPr algn="r">
+              <a:defRPr sz="1200" b="0">
+                <a:solidFill>
+                  <a:schemeClr val="bg1"/>
+                </a:solidFill>
+                <a:latin typeface="Century Gothic" panose="020B0502020202020204" pitchFamily="34" charset="0"/>
+              </a:defRPr>
+            </a:lvl1pPr>
+          </a:lstStyle>
+          <a:p>
+            <a:fld id="{105822BA-B7AE-4DDB-BAFC-C8E55FB5C986}" type="slidenum">
+              <a:rPr lang="en-CA" smtClean="0"/>
+              <a:pPr/>
+              <a:t>‹#›</a:t>
+            </a:fld>
+            <a:endParaRPr lang="en-CA" dirty="0"/>
+          </a:p>
+        </p:txBody>
+      </p:sp>
+      <p:pic>
+        <p:nvPicPr>
+          <p:cNvPr id="4" name="Picture 3"/>
+          <p:cNvPicPr>
+            <a:picLocks noChangeAspect="1"/>
+          </p:cNvPicPr>
+          <p:nvPr userDrawn="1"/>
+        </p:nvPicPr>
+        <p:blipFill>
+          <a:blip r:embed="rId2" cstate="print">
+            <a:extLst>
+              <a:ext uri="{28A0092B-C50C-407E-A947-70E740481C1C}">
+                <a14:useLocalDpi xmlns:a14="http://schemas.microsoft.com/office/drawing/2010/main" val="0"/>
+              </a:ext>
+            </a:extLst>
+          </a:blip>
+          <a:stretch>
+            <a:fillRect/>
+          </a:stretch>
+        </p:blipFill>
+        <p:spPr>
+          <a:xfrm>
+            <a:off x="600" y="6062366"/>
+            <a:ext cx="12192000" cy="795634"/>
+          </a:xfrm>
+          <a:prstGeom prst="rect">
+            <a:avLst/>
+          </a:prstGeom>
+        </p:spPr>
+      </p:pic>
     </p:spTree>
     <p:extLst>
       <p:ext uri="{BB962C8B-B14F-4D97-AF65-F5344CB8AC3E}">
@@ -3126,12 +3045,11 @@
       </p:par>
     </p:tnLst>
   </p:timing>
-  <p:hf hdr="0" ftr="0" dt="0"/>
 </p:sldLayout>
 </file>
 
 <file path=ppt/slideLayouts/slideLayout8.xml><?xml version="1.0" encoding="utf-8"?>
-<p:sldLayout xmlns:a="http://schemas.openxmlformats.org/drawingml/2006/main" xmlns:r="http://schemas.openxmlformats.org/officeDocument/2006/relationships" xmlns:p="http://schemas.openxmlformats.org/presentationml/2006/main" type="blank" preserve="1">
+<p:sldLayout xmlns:a="http://schemas.openxmlformats.org/drawingml/2006/main" xmlns:r="http://schemas.openxmlformats.org/officeDocument/2006/relationships" xmlns:p="http://schemas.openxmlformats.org/presentationml/2006/main" preserve="1" userDrawn="1">
   <p:cSld name="Blank (light)">
     <p:spTree>
       <p:nvGrpSpPr>
@@ -3147,6 +3065,60 @@
           <a:chExt cx="0" cy="0"/>
         </a:xfrm>
       </p:grpSpPr>
+      <p:sp>
+        <p:nvSpPr>
+          <p:cNvPr id="3" name="Content Placeholder 2"/>
+          <p:cNvSpPr>
+            <a:spLocks noGrp="1"/>
+          </p:cNvSpPr>
+          <p:nvPr>
+            <p:ph sz="quarter" idx="10" hasCustomPrompt="1"/>
+          </p:nvPr>
+        </p:nvSpPr>
+        <p:spPr>
+          <a:xfrm>
+            <a:off x="469900" y="6235700"/>
+            <a:ext cx="11201400" cy="482600"/>
+          </a:xfrm>
+        </p:spPr>
+        <p:txBody>
+          <a:bodyPr anchor="ctr"/>
+          <a:lstStyle>
+            <a:lvl1pPr marL="0" indent="0" algn="ctr">
+              <a:buNone/>
+              <a:defRPr baseline="0"/>
+            </a:lvl1pPr>
+          </a:lstStyle>
+          <a:p>
+            <a:pPr lvl="0"/>
+            <a:r>
+              <a:rPr lang="en-US" dirty="0" smtClean="0"/>
+              <a:t>Click to add text | </a:t>
+            </a:r>
+            <a:r>
+              <a:rPr lang="en-US" dirty="0" err="1" smtClean="0"/>
+              <a:t>Cliquez</a:t>
+            </a:r>
+            <a:r>
+              <a:rPr lang="en-US" dirty="0" smtClean="0"/>
+              <a:t> pour </a:t>
+            </a:r>
+            <a:r>
+              <a:rPr lang="en-US" dirty="0" err="1" smtClean="0"/>
+              <a:t>ajouter</a:t>
+            </a:r>
+            <a:r>
+              <a:rPr lang="en-US" dirty="0" smtClean="0"/>
+              <a:t> le </a:t>
+            </a:r>
+            <a:r>
+              <a:rPr lang="en-US" dirty="0" err="1" smtClean="0"/>
+              <a:t>texte</a:t>
+            </a:r>
+            <a:endParaRPr lang="en-CA" dirty="0"/>
+          </a:p>
+        </p:txBody>
+      </p:sp>
     </p:spTree>
     <p:extLst>
       <p:ext uri="{BB962C8B-B14F-4D97-AF65-F5344CB8AC3E}">
@@ -3185,6 +3157,67 @@
           <a:chExt cx="0" cy="0"/>
         </a:xfrm>
       </p:grpSpPr>
+      <p:sp>
+        <p:nvSpPr>
+          <p:cNvPr id="2" name="Content Placeholder 2"/>
+          <p:cNvSpPr>
+            <a:spLocks noGrp="1"/>
+          </p:cNvSpPr>
+          <p:nvPr>
+            <p:ph sz="quarter" idx="10" hasCustomPrompt="1"/>
+          </p:nvPr>
+        </p:nvSpPr>
+        <p:spPr>
+          <a:xfrm>
+            <a:off x="469900" y="6235700"/>
+            <a:ext cx="11201400" cy="482600"/>
+          </a:xfrm>
+          <a:solidFill>
+            <a:srgbClr val="33333E"/>
+          </a:solidFill>
+        </p:spPr>
+        <p:txBody>
+          <a:bodyPr anchor="ctr"/>
+          <a:lstStyle>
+            <a:lvl1pPr marL="0" indent="0" algn="ctr">
+              <a:buNone/>
+              <a:defRPr baseline="0">
+                <a:solidFill>
+                  <a:schemeClr val="bg1"/>
+                </a:solidFill>
+              </a:defRPr>
+            </a:lvl1pPr>
+          </a:lstStyle>
+          <a:p>
+            <a:pPr lvl="0"/>
+            <a:r>
+              <a:rPr lang="en-US" dirty="0" smtClean="0"/>
+              <a:t>Click to add text | </a:t>
+            </a:r>
+            <a:r>
+              <a:rPr lang="en-US" dirty="0" err="1" smtClean="0"/>
+              <a:t>Cliquez</a:t>
+            </a:r>
+            <a:r>
+              <a:rPr lang="en-US" dirty="0" smtClean="0"/>
+              <a:t> pour </a:t>
+            </a:r>
+            <a:r>
+              <a:rPr lang="en-US" dirty="0" err="1" smtClean="0"/>
+              <a:t>ajouter</a:t>
+            </a:r>
+            <a:r>
+              <a:rPr lang="en-US" dirty="0" smtClean="0"/>
+              <a:t> le </a:t>
+            </a:r>
+            <a:r>
+              <a:rPr lang="en-US" dirty="0" err="1" smtClean="0"/>
+              <a:t>texte</a:t>
+            </a:r>
+            <a:endParaRPr lang="en-CA" dirty="0"/>
+          </a:p>
+        </p:txBody>
+      </p:sp>
     </p:spTree>
     <p:extLst>
       <p:ext uri="{BB962C8B-B14F-4D97-AF65-F5344CB8AC3E}">
@@ -3517,11 +3550,6 @@
             </a:lvl1pPr>
           </a:lstStyle>
           <a:p>
-            <a:fld id="{FC5A612A-538F-400F-9846-A3C02CFBCD75}" type="datetimeFigureOut">
-              <a:rPr lang="en-CA" smtClean="0"/>
-              <a:pPr/>
-              <a:t>2019-09-09</a:t>
-            </a:fld>
             <a:endParaRPr lang="en-CA" dirty="0"/>
           </a:p>
         </p:txBody>
@@ -3587,7 +3615,7 @@
             <a:lvl1pPr algn="r">
               <a:defRPr sz="1200">
                 <a:solidFill>
-                  <a:schemeClr val="tx2"/>
+                  <a:srgbClr val="49505A"/>
                 </a:solidFill>
                 <a:latin typeface="Century Gothic" panose="020B0502020202020204" pitchFamily="34" charset="0"/>
               </a:defRPr>
@@ -3622,6 +3650,7 @@
     <p:sldLayoutId id="2147483655" r:id="rId8"/>
     <p:sldLayoutId id="2147483666" r:id="rId9"/>
   </p:sldLayoutIdLst>
+  <p:hf hdr="0" ftr="0" dt="0"/>
   <p:txStyles>
     <p:titleStyle>
       <a:lvl1pPr algn="l" defTabSz="914377" rtl="0" eaLnBrk="1" latinLnBrk="0" hangingPunct="1">
@@ -3954,7 +3983,7 @@
       </p:grpSpPr>
       <p:sp>
         <p:nvSpPr>
-          <p:cNvPr id="4" name="Title 3"/>
+          <p:cNvPr id="2" name="Title 1"/>
           <p:cNvSpPr>
             <a:spLocks noGrp="1"/>
           </p:cNvSpPr>
@@ -3967,17 +3996,13 @@
           <a:bodyPr/>
           <a:lstStyle/>
           <a:p>
-            <a:r>
-              <a:rPr lang="en-CA" dirty="0" smtClean="0"/>
-              <a:t>Title page with solid logo</a:t>
-            </a:r>
-            <a:endParaRPr lang="en-CA" dirty="0"/>
+            <a:endParaRPr lang="en-CA"/>
           </a:p>
         </p:txBody>
       </p:sp>
       <p:sp>
         <p:nvSpPr>
-          <p:cNvPr id="5" name="Subtitle 4"/>
+          <p:cNvPr id="3" name="Subtitle 2"/>
           <p:cNvSpPr>
             <a:spLocks noGrp="1"/>
           </p:cNvSpPr>
@@ -3990,18 +4015,14 @@
           <a:bodyPr/>
           <a:lstStyle/>
           <a:p>
-            <a:r>
-              <a:rPr lang="en-CA" dirty="0" smtClean="0"/>
-              <a:t>First option</a:t>
-            </a:r>
-            <a:endParaRPr lang="en-CA" dirty="0"/>
+            <a:endParaRPr lang="en-CA"/>
           </a:p>
         </p:txBody>
       </p:sp>
     </p:spTree>
     <p:extLst>
       <p:ext uri="{BB962C8B-B14F-4D97-AF65-F5344CB8AC3E}">
-        <p14:creationId xmlns:p14="http://schemas.microsoft.com/office/powerpoint/2010/main" val="2656035694"/>
+        <p14:creationId xmlns:p14="http://schemas.microsoft.com/office/powerpoint/2010/main" val="2229175721"/>
       </p:ext>
     </p:extLst>
   </p:cSld>
@@ -4037,263 +4058,6 @@
       </p:grpSpPr>
       <p:sp>
         <p:nvSpPr>
-          <p:cNvPr id="6" name="Title 5"/>
-          <p:cNvSpPr>
-            <a:spLocks noGrp="1"/>
-          </p:cNvSpPr>
-          <p:nvPr>
-            <p:ph type="ctrTitle"/>
-          </p:nvPr>
-        </p:nvSpPr>
-        <p:spPr/>
-        <p:txBody>
-          <a:bodyPr/>
-          <a:lstStyle/>
-          <a:p>
-            <a:r>
-              <a:rPr lang="en-CA" dirty="0" smtClean="0"/>
-              <a:t>Title page with outline logo</a:t>
-            </a:r>
-            <a:endParaRPr lang="en-CA" dirty="0"/>
-          </a:p>
-        </p:txBody>
-      </p:sp>
-      <p:sp>
-        <p:nvSpPr>
-          <p:cNvPr id="7" name="Subtitle 6"/>
-          <p:cNvSpPr>
-            <a:spLocks noGrp="1"/>
-          </p:cNvSpPr>
-          <p:nvPr>
-            <p:ph type="subTitle" idx="1"/>
-          </p:nvPr>
-        </p:nvSpPr>
-        <p:spPr/>
-        <p:txBody>
-          <a:bodyPr/>
-          <a:lstStyle/>
-          <a:p>
-            <a:r>
-              <a:rPr lang="en-CA" dirty="0" smtClean="0"/>
-              <a:t>Second </a:t>
-            </a:r>
-            <a:r>
-              <a:rPr lang="en-CA" dirty="0" smtClean="0"/>
-              <a:t>option</a:t>
-            </a:r>
-            <a:endParaRPr lang="en-CA" dirty="0"/>
-          </a:p>
-        </p:txBody>
-      </p:sp>
-    </p:spTree>
-    <p:extLst>
-      <p:ext uri="{BB962C8B-B14F-4D97-AF65-F5344CB8AC3E}">
-        <p14:creationId xmlns:p14="http://schemas.microsoft.com/office/powerpoint/2010/main" val="2142492951"/>
-      </p:ext>
-    </p:extLst>
-  </p:cSld>
-  <p:clrMapOvr>
-    <a:masterClrMapping/>
-  </p:clrMapOvr>
-  <p:timing>
-    <p:tnLst>
-      <p:par>
-        <p:cTn id="1" dur="indefinite" restart="never" nodeType="tmRoot"/>
-      </p:par>
-    </p:tnLst>
-  </p:timing>
-</p:sld>
-</file>
-
-<file path=ppt/slides/slide3.xml><?xml version="1.0" encoding="utf-8"?>
-<p:sld xmlns:a="http://schemas.openxmlformats.org/drawingml/2006/main" xmlns:r="http://schemas.openxmlformats.org/officeDocument/2006/relationships" xmlns:p="http://schemas.openxmlformats.org/presentationml/2006/main">
-  <p:cSld>
-    <p:spTree>
-      <p:nvGrpSpPr>
-        <p:cNvPr id="1" name=""/>
-        <p:cNvGrpSpPr/>
-        <p:nvPr/>
-      </p:nvGrpSpPr>
-      <p:grpSpPr>
-        <a:xfrm>
-          <a:off x="0" y="0"/>
-          <a:ext cx="0" cy="0"/>
-          <a:chOff x="0" y="0"/>
-          <a:chExt cx="0" cy="0"/>
-        </a:xfrm>
-      </p:grpSpPr>
-      <p:sp>
-        <p:nvSpPr>
-          <p:cNvPr id="4" name="Title 3"/>
-          <p:cNvSpPr>
-            <a:spLocks noGrp="1"/>
-          </p:cNvSpPr>
-          <p:nvPr>
-            <p:ph type="ctrTitle"/>
-          </p:nvPr>
-        </p:nvSpPr>
-        <p:spPr/>
-        <p:txBody>
-          <a:bodyPr/>
-          <a:lstStyle/>
-          <a:p>
-            <a:r>
-              <a:rPr lang="en-CA" dirty="0" smtClean="0"/>
-              <a:t>Plain title page</a:t>
-            </a:r>
-            <a:endParaRPr lang="en-CA" dirty="0"/>
-          </a:p>
-        </p:txBody>
-      </p:sp>
-      <p:sp>
-        <p:nvSpPr>
-          <p:cNvPr id="5" name="Subtitle 4"/>
-          <p:cNvSpPr>
-            <a:spLocks noGrp="1"/>
-          </p:cNvSpPr>
-          <p:nvPr>
-            <p:ph type="subTitle" idx="1"/>
-          </p:nvPr>
-        </p:nvSpPr>
-        <p:spPr/>
-        <p:txBody>
-          <a:bodyPr/>
-          <a:lstStyle/>
-          <a:p>
-            <a:r>
-              <a:rPr lang="en-CA" dirty="0" smtClean="0"/>
-              <a:t>Third </a:t>
-            </a:r>
-            <a:r>
-              <a:rPr lang="en-CA" dirty="0" smtClean="0"/>
-              <a:t>option</a:t>
-            </a:r>
-            <a:endParaRPr lang="en-CA" dirty="0"/>
-          </a:p>
-        </p:txBody>
-      </p:sp>
-    </p:spTree>
-    <p:extLst>
-      <p:ext uri="{BB962C8B-B14F-4D97-AF65-F5344CB8AC3E}">
-        <p14:creationId xmlns:p14="http://schemas.microsoft.com/office/powerpoint/2010/main" val="2412717122"/>
-      </p:ext>
-    </p:extLst>
-  </p:cSld>
-  <p:clrMapOvr>
-    <a:masterClrMapping/>
-  </p:clrMapOvr>
-  <p:timing>
-    <p:tnLst>
-      <p:par>
-        <p:cTn id="1" dur="indefinite" restart="never" nodeType="tmRoot"/>
-      </p:par>
-    </p:tnLst>
-  </p:timing>
-</p:sld>
-</file>
-
-<file path=ppt/slides/slide4.xml><?xml version="1.0" encoding="utf-8"?>
-<p:sld xmlns:a="http://schemas.openxmlformats.org/drawingml/2006/main" xmlns:r="http://schemas.openxmlformats.org/officeDocument/2006/relationships" xmlns:p="http://schemas.openxmlformats.org/presentationml/2006/main">
-  <p:cSld>
-    <p:spTree>
-      <p:nvGrpSpPr>
-        <p:cNvPr id="1" name=""/>
-        <p:cNvGrpSpPr/>
-        <p:nvPr/>
-      </p:nvGrpSpPr>
-      <p:grpSpPr>
-        <a:xfrm>
-          <a:off x="0" y="0"/>
-          <a:ext cx="0" cy="0"/>
-          <a:chOff x="0" y="0"/>
-          <a:chExt cx="0" cy="0"/>
-        </a:xfrm>
-      </p:grpSpPr>
-      <p:sp>
-        <p:nvSpPr>
-          <p:cNvPr id="4" name="Title 3"/>
-          <p:cNvSpPr>
-            <a:spLocks noGrp="1"/>
-          </p:cNvSpPr>
-          <p:nvPr>
-            <p:ph type="ctrTitle"/>
-          </p:nvPr>
-        </p:nvSpPr>
-        <p:spPr/>
-        <p:txBody>
-          <a:bodyPr/>
-          <a:lstStyle/>
-          <a:p>
-            <a:r>
-              <a:rPr lang="en-CA" dirty="0" smtClean="0"/>
-              <a:t>Title page with large checkmark</a:t>
-            </a:r>
-            <a:endParaRPr lang="en-CA" dirty="0"/>
-          </a:p>
-        </p:txBody>
-      </p:sp>
-      <p:sp>
-        <p:nvSpPr>
-          <p:cNvPr id="5" name="Subtitle 4"/>
-          <p:cNvSpPr>
-            <a:spLocks noGrp="1"/>
-          </p:cNvSpPr>
-          <p:nvPr>
-            <p:ph type="subTitle" idx="1"/>
-          </p:nvPr>
-        </p:nvSpPr>
-        <p:spPr/>
-        <p:txBody>
-          <a:bodyPr/>
-          <a:lstStyle/>
-          <a:p>
-            <a:r>
-              <a:rPr lang="en-CA" dirty="0" smtClean="0"/>
-              <a:t>Fourth option</a:t>
-            </a:r>
-            <a:endParaRPr lang="en-CA" dirty="0"/>
-          </a:p>
-        </p:txBody>
-      </p:sp>
-    </p:spTree>
-    <p:extLst>
-      <p:ext uri="{BB962C8B-B14F-4D97-AF65-F5344CB8AC3E}">
-        <p14:creationId xmlns:p14="http://schemas.microsoft.com/office/powerpoint/2010/main" val="1218411595"/>
-      </p:ext>
-    </p:extLst>
-  </p:cSld>
-  <p:clrMapOvr>
-    <a:masterClrMapping/>
-  </p:clrMapOvr>
-  <p:timing>
-    <p:tnLst>
-      <p:par>
-        <p:cTn id="1" dur="indefinite" restart="never" nodeType="tmRoot"/>
-      </p:par>
-    </p:tnLst>
-  </p:timing>
-</p:sld>
-</file>
-
-<file path=ppt/slides/slide5.xml><?xml version="1.0" encoding="utf-8"?>
-<p:sld xmlns:a="http://schemas.openxmlformats.org/drawingml/2006/main" xmlns:r="http://schemas.openxmlformats.org/officeDocument/2006/relationships" xmlns:p="http://schemas.openxmlformats.org/presentationml/2006/main">
-  <p:cSld>
-    <p:spTree>
-      <p:nvGrpSpPr>
-        <p:cNvPr id="1" name=""/>
-        <p:cNvGrpSpPr/>
-        <p:nvPr/>
-      </p:nvGrpSpPr>
-      <p:grpSpPr>
-        <a:xfrm>
-          <a:off x="0" y="0"/>
-          <a:ext cx="0" cy="0"/>
-          <a:chOff x="0" y="0"/>
-          <a:chExt cx="0" cy="0"/>
-        </a:xfrm>
-      </p:grpSpPr>
-      <p:sp>
-        <p:nvSpPr>
           <p:cNvPr id="4" name="Title 3"/>
           <p:cNvSpPr>
             <a:spLocks noGrp="1"/>
@@ -4302,24 +4066,44 @@
             <p:ph type="title"/>
           </p:nvPr>
         </p:nvSpPr>
-        <p:spPr>
-          <a:xfrm>
-            <a:off x="428400" y="326222"/>
-            <a:ext cx="11336400" cy="437951"/>
-          </a:xfrm>
-        </p:spPr>
+        <p:spPr/>
         <p:txBody>
           <a:bodyPr/>
           <a:lstStyle/>
           <a:p>
             <a:r>
-              <a:rPr lang="en-CA" dirty="0" smtClean="0"/>
-              <a:t>Plain slide with title</a:t>
+              <a:rPr lang="en-US" dirty="0" smtClean="0"/>
+              <a:t>Select a slide layout</a:t>
             </a:r>
             <a:endParaRPr lang="en-CA" dirty="0"/>
           </a:p>
         </p:txBody>
       </p:sp>
+      <p:pic>
+        <p:nvPicPr>
+          <p:cNvPr id="8" name="__EngageSlideDescription__" descr="slide description : Instructions for selecting a slide layout."/>
+          <p:cNvPicPr>
+            <a:picLocks/>
+          </p:cNvPicPr>
+          <p:nvPr/>
+        </p:nvPicPr>
+        <p:blipFill>
+          <a:blip r:embed="rId2"/>
+          <a:stretch>
+            <a:fillRect/>
+          </a:stretch>
+        </p:blipFill>
+        <p:spPr>
+          <a:xfrm>
+            <a:off x="428400" y="785288"/>
+            <a:ext cx="12700" cy="12700"/>
+          </a:xfrm>
+          <a:prstGeom prst="rect">
+            <a:avLst/>
+          </a:prstGeom>
+          <a:ln/>
+        </p:spPr>
+      </p:pic>
       <p:sp>
         <p:nvSpPr>
           <p:cNvPr id="5" name="Content Placeholder 4"/>
@@ -4335,20 +4119,65 @@
           <a:bodyPr/>
           <a:lstStyle/>
           <a:p>
-            <a:r>
-              <a:rPr lang="en-CA" dirty="0" smtClean="0"/>
-              <a:t>Basic page template. </a:t>
-            </a:r>
-          </a:p>
-          <a:p>
-            <a:r>
-              <a:rPr lang="en-CA" dirty="0" smtClean="0"/>
-              <a:t>Works well when you want focus on the slide content.</a:t>
+            <a:pPr marL="285750" indent="-285750">
+              <a:buFont typeface="Arial" panose="020B0604020202020204" pitchFamily="34" charset="0"/>
+              <a:buChar char="•"/>
+            </a:pPr>
+            <a:r>
+              <a:rPr lang="en-US" dirty="0" smtClean="0"/>
+              <a:t>Right click a slide.</a:t>
+            </a:r>
+          </a:p>
+          <a:p>
+            <a:pPr marL="285750" indent="-285750">
+              <a:buFont typeface="Arial" panose="020B0604020202020204" pitchFamily="34" charset="0"/>
+              <a:buChar char="•"/>
+            </a:pPr>
+            <a:r>
+              <a:rPr lang="en-US" dirty="0" smtClean="0"/>
+              <a:t>Select “Layout” and pick a layout.</a:t>
             </a:r>
             <a:endParaRPr lang="en-CA" dirty="0"/>
           </a:p>
         </p:txBody>
       </p:sp>
+      <p:pic>
+        <p:nvPicPr>
+          <p:cNvPr id="7" name="Picture 6" descr="Screenshot showing how to select a slide layout using the slide properties menu."/>
+          <p:cNvPicPr>
+            <a:picLocks noChangeAspect="1"/>
+          </p:cNvPicPr>
+          <p:nvPr/>
+        </p:nvPicPr>
+        <p:blipFill>
+          <a:blip r:embed="rId3">
+            <a:extLst>
+              <a:ext uri="{28A0092B-C50C-407E-A947-70E740481C1C}">
+                <a14:useLocalDpi xmlns:a14="http://schemas.microsoft.com/office/drawing/2010/main" val="0"/>
+              </a:ext>
+            </a:extLst>
+          </a:blip>
+          <a:stretch>
+            <a:fillRect/>
+          </a:stretch>
+        </p:blipFill>
+        <p:spPr>
+          <a:xfrm>
+            <a:off x="5956938" y="1172094"/>
+            <a:ext cx="4911172" cy="4176315"/>
+          </a:xfrm>
+          <a:prstGeom prst="rect">
+            <a:avLst/>
+          </a:prstGeom>
+          <a:ln w="50800">
+            <a:solidFill>
+              <a:schemeClr val="bg1">
+                <a:lumMod val="75000"/>
+              </a:schemeClr>
+            </a:solidFill>
+          </a:ln>
+        </p:spPr>
+      </p:pic>
       <p:sp>
         <p:nvSpPr>
           <p:cNvPr id="6" name="Slide Number Placeholder 5"/>
@@ -4359,294 +4188,44 @@
             <p:ph type="sldNum" sz="quarter" idx="4"/>
           </p:nvPr>
         </p:nvSpPr>
-        <p:spPr/>
+        <p:spPr>
+          <a:solidFill>
+            <a:srgbClr val="631E75"/>
+          </a:solidFill>
+        </p:spPr>
         <p:txBody>
           <a:bodyPr/>
           <a:lstStyle/>
           <a:p>
             <a:fld id="{105822BA-B7AE-4DDB-BAFC-C8E55FB5C986}" type="slidenum">
-              <a:rPr lang="en-CA" smtClean="0"/>
+              <a:rPr lang="en-CA" smtClean="0">
+                <a:solidFill>
+                  <a:srgbClr val="FFFFFF"/>
+                </a:solidFill>
+              </a:rPr>
               <a:pPr/>
-              <a:t>5</a:t>
+              <a:t>2</a:t>
             </a:fld>
-            <a:endParaRPr lang="en-CA" dirty="0"/>
+            <a:r>
+              <a:rPr lang="en-CA" smtClean="0">
+                <a:solidFill>
+                  <a:srgbClr val="FFFFFF"/>
+                </a:solidFill>
+              </a:rPr>
+              <a:t> </a:t>
+            </a:r>
+            <a:endParaRPr lang="en-CA" dirty="0">
+              <a:solidFill>
+                <a:srgbClr val="FFFFFF"/>
+              </a:solidFill>
+            </a:endParaRPr>
           </a:p>
         </p:txBody>
       </p:sp>
     </p:spTree>
     <p:extLst>
       <p:ext uri="{BB962C8B-B14F-4D97-AF65-F5344CB8AC3E}">
-        <p14:creationId xmlns:p14="http://schemas.microsoft.com/office/powerpoint/2010/main" val="3281161870"/>
-      </p:ext>
-    </p:extLst>
-  </p:cSld>
-  <p:clrMapOvr>
-    <a:masterClrMapping/>
-  </p:clrMapOvr>
-  <p:timing>
-    <p:tnLst>
-      <p:par>
-        <p:cTn id="1" dur="indefinite" restart="never" nodeType="tmRoot"/>
-      </p:par>
-    </p:tnLst>
-  </p:timing>
-</p:sld>
-</file>
-
-<file path=ppt/slides/slide6.xml><?xml version="1.0" encoding="utf-8"?>
-<p:sld xmlns:a="http://schemas.openxmlformats.org/drawingml/2006/main" xmlns:r="http://schemas.openxmlformats.org/officeDocument/2006/relationships" xmlns:p="http://schemas.openxmlformats.org/presentationml/2006/main">
-  <p:cSld>
-    <p:spTree>
-      <p:nvGrpSpPr>
-        <p:cNvPr id="1" name=""/>
-        <p:cNvGrpSpPr/>
-        <p:nvPr/>
-      </p:nvGrpSpPr>
-      <p:grpSpPr>
-        <a:xfrm>
-          <a:off x="0" y="0"/>
-          <a:ext cx="0" cy="0"/>
-          <a:chOff x="0" y="0"/>
-          <a:chExt cx="0" cy="0"/>
-        </a:xfrm>
-      </p:grpSpPr>
-      <p:sp>
-        <p:nvSpPr>
-          <p:cNvPr id="2" name="Title 1"/>
-          <p:cNvSpPr>
-            <a:spLocks noGrp="1"/>
-          </p:cNvSpPr>
-          <p:nvPr>
-            <p:ph type="title"/>
-          </p:nvPr>
-        </p:nvSpPr>
-        <p:spPr/>
-        <p:txBody>
-          <a:bodyPr/>
-          <a:lstStyle/>
-          <a:p>
-            <a:r>
-              <a:rPr lang="en-CA" dirty="0"/>
-              <a:t>Emphasized page numbers</a:t>
-            </a:r>
-          </a:p>
-        </p:txBody>
-      </p:sp>
-      <p:sp>
-        <p:nvSpPr>
-          <p:cNvPr id="3" name="Content Placeholder 2"/>
-          <p:cNvSpPr>
-            <a:spLocks noGrp="1"/>
-          </p:cNvSpPr>
-          <p:nvPr>
-            <p:ph idx="1"/>
-          </p:nvPr>
-        </p:nvSpPr>
-        <p:spPr/>
-        <p:txBody>
-          <a:bodyPr/>
-          <a:lstStyle/>
-          <a:p>
-            <a:pPr marL="285750" indent="-285750">
-              <a:buFont typeface="Arial" panose="020B0604020202020204" pitchFamily="34" charset="0"/>
-              <a:buChar char="•"/>
-            </a:pPr>
-            <a:r>
-              <a:rPr lang="en-CA" dirty="0"/>
-              <a:t>This template highlights the current page number.</a:t>
-            </a:r>
-          </a:p>
-          <a:p>
-            <a:pPr marL="285750" indent="-285750">
-              <a:buFont typeface="Arial" panose="020B0604020202020204" pitchFamily="34" charset="0"/>
-              <a:buChar char="•"/>
-            </a:pPr>
-            <a:r>
-              <a:rPr lang="en-CA" dirty="0"/>
-              <a:t>It also provides a visual anchor at the bottom.</a:t>
-            </a:r>
-          </a:p>
-          <a:p>
-            <a:endParaRPr lang="en-CA" dirty="0"/>
-          </a:p>
-        </p:txBody>
-      </p:sp>
-      <p:sp>
-        <p:nvSpPr>
-          <p:cNvPr id="4" name="Slide Number Placeholder 3"/>
-          <p:cNvSpPr>
-            <a:spLocks noGrp="1"/>
-          </p:cNvSpPr>
-          <p:nvPr>
-            <p:ph type="sldNum" sz="quarter" idx="4"/>
-          </p:nvPr>
-        </p:nvSpPr>
-        <p:spPr/>
-        <p:txBody>
-          <a:bodyPr/>
-          <a:lstStyle/>
-          <a:p>
-            <a:fld id="{105822BA-B7AE-4DDB-BAFC-C8E55FB5C986}" type="slidenum">
-              <a:rPr lang="en-CA" smtClean="0"/>
-              <a:pPr/>
-              <a:t>6</a:t>
-            </a:fld>
-            <a:r>
-              <a:rPr lang="en-CA" smtClean="0"/>
-              <a:t> </a:t>
-            </a:r>
-            <a:endParaRPr lang="en-CA" dirty="0"/>
-          </a:p>
-        </p:txBody>
-      </p:sp>
-    </p:spTree>
-    <p:extLst>
-      <p:ext uri="{BB962C8B-B14F-4D97-AF65-F5344CB8AC3E}">
-        <p14:creationId xmlns:p14="http://schemas.microsoft.com/office/powerpoint/2010/main" val="2811340229"/>
-      </p:ext>
-    </p:extLst>
-  </p:cSld>
-  <p:clrMapOvr>
-    <a:masterClrMapping/>
-  </p:clrMapOvr>
-  <p:timing>
-    <p:tnLst>
-      <p:par>
-        <p:cTn id="1" dur="indefinite" restart="never" nodeType="tmRoot"/>
-      </p:par>
-    </p:tnLst>
-  </p:timing>
-</p:sld>
-</file>
-
-<file path=ppt/slides/slide7.xml><?xml version="1.0" encoding="utf-8"?>
-<p:sld xmlns:a="http://schemas.openxmlformats.org/drawingml/2006/main" xmlns:r="http://schemas.openxmlformats.org/officeDocument/2006/relationships" xmlns:p="http://schemas.openxmlformats.org/presentationml/2006/main">
-  <p:cSld>
-    <p:spTree>
-      <p:nvGrpSpPr>
-        <p:cNvPr id="1" name=""/>
-        <p:cNvGrpSpPr/>
-        <p:nvPr/>
-      </p:nvGrpSpPr>
-      <p:grpSpPr>
-        <a:xfrm>
-          <a:off x="0" y="0"/>
-          <a:ext cx="0" cy="0"/>
-          <a:chOff x="0" y="0"/>
-          <a:chExt cx="0" cy="0"/>
-        </a:xfrm>
-      </p:grpSpPr>
-      <p:sp>
-        <p:nvSpPr>
-          <p:cNvPr id="2" name="Title 1"/>
-          <p:cNvSpPr>
-            <a:spLocks noGrp="1"/>
-          </p:cNvSpPr>
-          <p:nvPr>
-            <p:ph type="title"/>
-          </p:nvPr>
-        </p:nvSpPr>
-        <p:spPr/>
-        <p:txBody>
-          <a:bodyPr/>
-          <a:lstStyle/>
-          <a:p>
-            <a:r>
-              <a:rPr lang="en-CA" dirty="0" smtClean="0"/>
-              <a:t>Footer subtitle</a:t>
-            </a:r>
-            <a:endParaRPr lang="en-CA" dirty="0"/>
-          </a:p>
-        </p:txBody>
-      </p:sp>
-      <p:sp>
-        <p:nvSpPr>
-          <p:cNvPr id="3" name="Content Placeholder 2"/>
-          <p:cNvSpPr>
-            <a:spLocks noGrp="1"/>
-          </p:cNvSpPr>
-          <p:nvPr>
-            <p:ph idx="1"/>
-          </p:nvPr>
-        </p:nvSpPr>
-        <p:spPr/>
-        <p:txBody>
-          <a:bodyPr/>
-          <a:lstStyle/>
-          <a:p>
-            <a:pPr marL="285750" indent="-285750">
-              <a:buFont typeface="Arial" panose="020B0604020202020204" pitchFamily="34" charset="0"/>
-              <a:buChar char="•"/>
-            </a:pPr>
-            <a:r>
-              <a:rPr lang="en-CA" dirty="0" smtClean="0"/>
-              <a:t>Can be used to emphasize point again in the footer.</a:t>
-            </a:r>
-          </a:p>
-          <a:p>
-            <a:pPr marL="285750" indent="-285750">
-              <a:buFont typeface="Arial" panose="020B0604020202020204" pitchFamily="34" charset="0"/>
-              <a:buChar char="•"/>
-            </a:pPr>
-            <a:r>
-              <a:rPr lang="en-CA" dirty="0" smtClean="0"/>
-              <a:t>Provides a strong visual anchor at the bottom.</a:t>
-            </a:r>
-            <a:endParaRPr lang="en-CA" dirty="0"/>
-          </a:p>
-        </p:txBody>
-      </p:sp>
-      <p:sp>
-        <p:nvSpPr>
-          <p:cNvPr id="4" name="Slide Number Placeholder 3"/>
-          <p:cNvSpPr>
-            <a:spLocks noGrp="1"/>
-          </p:cNvSpPr>
-          <p:nvPr>
-            <p:ph type="sldNum" sz="quarter" idx="4"/>
-          </p:nvPr>
-        </p:nvSpPr>
-        <p:spPr/>
-        <p:txBody>
-          <a:bodyPr/>
-          <a:lstStyle/>
-          <a:p>
-            <a:fld id="{105822BA-B7AE-4DDB-BAFC-C8E55FB5C986}" type="slidenum">
-              <a:rPr lang="en-CA" smtClean="0"/>
-              <a:pPr/>
-              <a:t>7</a:t>
-            </a:fld>
-            <a:endParaRPr lang="en-CA" dirty="0"/>
-          </a:p>
-        </p:txBody>
-      </p:sp>
-      <p:sp>
-        <p:nvSpPr>
-          <p:cNvPr id="5" name="Content Placeholder 4"/>
-          <p:cNvSpPr>
-            <a:spLocks noGrp="1"/>
-          </p:cNvSpPr>
-          <p:nvPr>
-            <p:ph sz="quarter" idx="10"/>
-          </p:nvPr>
-        </p:nvSpPr>
-        <p:spPr/>
-        <p:txBody>
-          <a:bodyPr/>
-          <a:lstStyle/>
-          <a:p>
-            <a:r>
-              <a:rPr lang="en-CA" dirty="0" smtClean="0"/>
-              <a:t>Key point here</a:t>
-            </a:r>
-            <a:endParaRPr lang="en-CA" dirty="0"/>
-          </a:p>
-        </p:txBody>
-      </p:sp>
-    </p:spTree>
-    <p:extLst>
-      <p:ext uri="{BB962C8B-B14F-4D97-AF65-F5344CB8AC3E}">
-        <p14:creationId xmlns:p14="http://schemas.microsoft.com/office/powerpoint/2010/main" val="992434046"/>
+        <p14:creationId xmlns:p14="http://schemas.microsoft.com/office/powerpoint/2010/main" val="3077120726"/>
       </p:ext>
     </p:extLst>
   </p:cSld>
@@ -4665,7 +4244,7 @@
 
 <file path=ppt/tags/tag1.xml><?xml version="1.0" encoding="utf-8"?>
 <p:tagLst xmlns:a="http://schemas.openxmlformats.org/drawingml/2006/main" xmlns:r="http://schemas.openxmlformats.org/officeDocument/2006/relationships" xmlns:p="http://schemas.openxmlformats.org/presentationml/2006/main">
-  <p:tag name="ENGAGE" val="{&quot;SavedSwatch&quot;:&quot;-16747630|-1615358|-5828210|-11231456|-12763591|Shared Services Canada&quot;,&quot;Id&quot;:&quot;5d76af1b43314338a0ed40b7&quot;,&quot;SmartGridHorizontal&quot;:0,&quot;LinkedExcelSources&quot;:{},&quot;LinkedProjectSources&quot;:{},&quot;FlowConfig&quot;:{&quot;Canvas&quot;:{&quot;Slide&quot;:-1,&quot;Width&quot;:0,&quot;Height&quot;:0},&quot;Timeline&quot;:{&quot;Actions&quot;:[]}},&quot;LinkedSlideMergeSources&quot;:{},&quot;LinkedSharePointSlideMergeSources&quot;:{}}"/>
+  <p:tag name="ENGAGE" val="{&quot;SavedSwatch&quot;:&quot;-16747630|-1615358|-5828210|-11231456|-12763591|Shared Services Canada&quot;,&quot;Id&quot;:&quot;5d77a61d43314327a4d51943&quot;,&quot;SmartGridHorizontal&quot;:0,&quot;LinkedExcelSources&quot;:{},&quot;LinkedProjectSources&quot;:{},&quot;FlowConfig&quot;:{&quot;Canvas&quot;:{&quot;Slide&quot;:-1,&quot;Width&quot;:0,&quot;Height&quot;:0},&quot;Timeline&quot;:{&quot;Actions&quot;:[]}},&quot;LinkedSlideMergeSources&quot;:{},&quot;LinkedSharePointSlideMergeSources&quot;:{}}"/>
 </p:tagLst>
 </file>
 

</xml_diff>

<commit_message>
Accessibility fixes basedon AAACT recommendations
- Increase font size
- Remove alt text from decorative images
</commit_message>
<xml_diff>
--- a/branding/templates/widescreen-template.pptx
+++ b/branding/templates/widescreen-template.pptx
@@ -207,7 +207,7 @@
           <a:p>
             <a:fld id="{C432A8CA-5653-4CB8-AEEB-44430BC38506}" type="datetimeFigureOut">
               <a:rPr lang="en-CA" smtClean="0"/>
-              <a:t>2019-09-10</a:t>
+              <a:t>2019-10-21</a:t>
             </a:fld>
             <a:endParaRPr lang="en-CA"/>
           </a:p>
@@ -372,7 +372,7 @@
           <a:p>
             <a:fld id="{F54FB522-10CE-4B3C-92A1-9B8FCA0AFF13}" type="datetimeFigureOut">
               <a:rPr lang="en-CA" smtClean="0"/>
-              <a:t>2019-09-10</a:t>
+              <a:t>2019-10-21</a:t>
             </a:fld>
             <a:endParaRPr lang="en-CA"/>
           </a:p>
@@ -679,7 +679,7 @@
           </a:bodyPr>
           <a:lstStyle>
             <a:lvl1pPr algn="l">
-              <a:defRPr sz="2400" b="1" baseline="0">
+              <a:defRPr sz="2800" b="1" baseline="0">
                 <a:solidFill>
                   <a:schemeClr val="tx1"/>
                 </a:solidFill>
@@ -739,7 +739,7 @@
           <a:lstStyle>
             <a:lvl1pPr marL="0" indent="0" algn="l">
               <a:buNone/>
-              <a:defRPr sz="1800">
+              <a:defRPr sz="2400">
                 <a:solidFill>
                   <a:srgbClr val="49505A"/>
                 </a:solidFill>
@@ -966,7 +966,7 @@
           </a:bodyPr>
           <a:lstStyle>
             <a:lvl1pPr algn="l">
-              <a:defRPr sz="2400" b="1" baseline="0">
+              <a:defRPr sz="2800" b="1" baseline="0">
                 <a:solidFill>
                   <a:schemeClr val="tx1"/>
                 </a:solidFill>
@@ -1026,7 +1026,7 @@
           <a:lstStyle>
             <a:lvl1pPr marL="0" indent="0" algn="l">
               <a:buNone/>
-              <a:defRPr sz="1800">
+              <a:defRPr sz="2400">
                 <a:solidFill>
                   <a:srgbClr val="49505A"/>
                 </a:solidFill>
@@ -1193,7 +1193,7 @@
           </a:bodyPr>
           <a:lstStyle>
             <a:lvl1pPr algn="l">
-              <a:defRPr sz="2400" b="1" baseline="0">
+              <a:defRPr sz="2800" b="1" baseline="0">
                 <a:solidFill>
                   <a:schemeClr val="tx1"/>
                 </a:solidFill>
@@ -1253,7 +1253,7 @@
           <a:lstStyle>
             <a:lvl1pPr marL="0" indent="0" algn="l">
               <a:buNone/>
-              <a:defRPr sz="1800">
+              <a:defRPr sz="2400">
                 <a:solidFill>
                   <a:srgbClr val="49505A"/>
                 </a:solidFill>
@@ -1434,7 +1434,7 @@
           </a:bodyPr>
           <a:lstStyle>
             <a:lvl1pPr algn="l">
-              <a:defRPr sz="2400" b="1" baseline="0">
+              <a:defRPr sz="2800" b="1" baseline="0">
                 <a:solidFill>
                   <a:schemeClr val="tx1"/>
                 </a:solidFill>
@@ -1445,11 +1445,7 @@
           <a:p>
             <a:r>
               <a:rPr lang="en-US" dirty="0" smtClean="0"/>
-              <a:t>Click to add </a:t>
-            </a:r>
-            <a:r>
-              <a:rPr lang="en-US" dirty="0" smtClean="0"/>
-              <a:t>title</a:t>
+              <a:t>Click to add title</a:t>
             </a:r>
             <a:endParaRPr lang="en-CA" dirty="0"/>
           </a:p>
@@ -1478,7 +1474,7 @@
           <a:lstStyle>
             <a:lvl1pPr marL="0" indent="0" algn="l">
               <a:buNone/>
-              <a:defRPr sz="1800">
+              <a:defRPr sz="2400">
                 <a:solidFill>
                   <a:srgbClr val="49505A"/>
                 </a:solidFill>
@@ -1521,11 +1517,7 @@
           <a:p>
             <a:r>
               <a:rPr lang="en-US" dirty="0" smtClean="0"/>
-              <a:t>Click to </a:t>
-            </a:r>
-            <a:r>
-              <a:rPr lang="en-US" dirty="0" smtClean="0"/>
-              <a:t>add subtitle</a:t>
+              <a:t>Click to add subtitle</a:t>
             </a:r>
             <a:endParaRPr lang="en-US" dirty="0"/>
           </a:p>
@@ -1613,7 +1605,7 @@
           </a:bodyPr>
           <a:lstStyle>
             <a:lvl1pPr>
-              <a:defRPr sz="2400" b="1" baseline="0">
+              <a:defRPr sz="2800" b="1" baseline="0">
                 <a:solidFill>
                   <a:schemeClr val="tx1"/>
                 </a:solidFill>
@@ -1673,7 +1665,7 @@
           <a:lstStyle>
             <a:lvl1pPr marL="228600" marR="0" indent="-228600" algn="l" defTabSz="914400" rtl="0" eaLnBrk="1" fontAlgn="auto" latinLnBrk="0" hangingPunct="1">
               <a:lnSpc>
-                <a:spcPct val="90000"/>
+                <a:spcPct val="150000"/>
               </a:lnSpc>
               <a:spcBef>
                 <a:spcPts val="1000"/>
@@ -1686,7 +1678,7 @@
               <a:buFont typeface="Arial" panose="020B0604020202020204" pitchFamily="34" charset="0"/>
               <a:buChar char="•"/>
               <a:tabLst/>
-              <a:defRPr sz="1800">
+              <a:defRPr sz="2400">
                 <a:solidFill>
                   <a:schemeClr val="tx1"/>
                 </a:solidFill>
@@ -1695,7 +1687,7 @@
             </a:lvl1pPr>
             <a:lvl2pPr marL="685800" marR="0" indent="-228600" algn="l" defTabSz="914400" rtl="0" eaLnBrk="1" fontAlgn="auto" latinLnBrk="0" hangingPunct="1">
               <a:lnSpc>
-                <a:spcPct val="90000"/>
+                <a:spcPct val="150000"/>
               </a:lnSpc>
               <a:spcBef>
                 <a:spcPts val="500"/>
@@ -1708,7 +1700,7 @@
               <a:buFont typeface="Arial" panose="020B0604020202020204" pitchFamily="34" charset="0"/>
               <a:buChar char="•"/>
               <a:tabLst/>
-              <a:defRPr sz="1800">
+              <a:defRPr sz="2400">
                 <a:solidFill>
                   <a:schemeClr val="tx1"/>
                 </a:solidFill>
@@ -1717,7 +1709,7 @@
             </a:lvl2pPr>
             <a:lvl3pPr marL="1143000" marR="0" indent="-228600" algn="l" defTabSz="914400" rtl="0" eaLnBrk="1" fontAlgn="auto" latinLnBrk="0" hangingPunct="1">
               <a:lnSpc>
-                <a:spcPct val="90000"/>
+                <a:spcPct val="150000"/>
               </a:lnSpc>
               <a:spcBef>
                 <a:spcPts val="500"/>
@@ -1730,7 +1722,7 @@
               <a:buFont typeface="Arial" panose="020B0604020202020204" pitchFamily="34" charset="0"/>
               <a:buChar char="•"/>
               <a:tabLst/>
-              <a:defRPr sz="1800">
+              <a:defRPr sz="2400">
                 <a:solidFill>
                   <a:schemeClr val="tx1"/>
                 </a:solidFill>
@@ -1739,7 +1731,7 @@
             </a:lvl3pPr>
             <a:lvl4pPr marL="1600200" marR="0" indent="-228600" algn="l" defTabSz="914400" rtl="0" eaLnBrk="1" fontAlgn="auto" latinLnBrk="0" hangingPunct="1">
               <a:lnSpc>
-                <a:spcPct val="90000"/>
+                <a:spcPct val="150000"/>
               </a:lnSpc>
               <a:spcBef>
                 <a:spcPts val="500"/>
@@ -1752,7 +1744,7 @@
               <a:buFont typeface="Arial" panose="020B0604020202020204" pitchFamily="34" charset="0"/>
               <a:buChar char="•"/>
               <a:tabLst/>
-              <a:defRPr sz="1800">
+              <a:defRPr sz="2400">
                 <a:solidFill>
                   <a:schemeClr val="tx1"/>
                 </a:solidFill>
@@ -1761,7 +1753,7 @@
             </a:lvl4pPr>
             <a:lvl5pPr marL="2057400" marR="0" indent="-228600" algn="l" defTabSz="914400" rtl="0" eaLnBrk="1" fontAlgn="auto" latinLnBrk="0" hangingPunct="1">
               <a:lnSpc>
-                <a:spcPct val="90000"/>
+                <a:spcPct val="150000"/>
               </a:lnSpc>
               <a:spcBef>
                 <a:spcPts val="500"/>
@@ -1774,7 +1766,7 @@
               <a:buFont typeface="Arial" panose="020B0604020202020204" pitchFamily="34" charset="0"/>
               <a:buChar char="•"/>
               <a:tabLst/>
-              <a:defRPr sz="1800">
+              <a:defRPr sz="2400">
                 <a:solidFill>
                   <a:schemeClr val="tx1"/>
                 </a:solidFill>
@@ -1816,10 +1808,6 @@
               <a:rPr lang="en-US" dirty="0" err="1" smtClean="0"/>
               <a:t>texte</a:t>
             </a:r>
-            <a:endParaRPr lang="en-US" dirty="0" smtClean="0"/>
-          </a:p>
-          <a:p>
-            <a:pPr lvl="0"/>
             <a:endParaRPr lang="en-US" dirty="0" smtClean="0"/>
           </a:p>
           <a:p>
@@ -2091,7 +2079,7 @@
           </a:bodyPr>
           <a:lstStyle>
             <a:lvl1pPr>
-              <a:defRPr sz="2400" b="1" baseline="0">
+              <a:defRPr sz="2800" b="1" baseline="0">
                 <a:solidFill>
                   <a:schemeClr val="tx1"/>
                 </a:solidFill>
@@ -2151,7 +2139,7 @@
           <a:lstStyle>
             <a:lvl1pPr marL="0" marR="0" indent="0" algn="l" defTabSz="914400" rtl="0" eaLnBrk="1" fontAlgn="auto" latinLnBrk="0" hangingPunct="1">
               <a:lnSpc>
-                <a:spcPct val="90000"/>
+                <a:spcPct val="150000"/>
               </a:lnSpc>
               <a:spcBef>
                 <a:spcPts val="1000"/>
@@ -2164,7 +2152,7 @@
               <a:buFont typeface="Arial" panose="020B0604020202020204" pitchFamily="34" charset="0"/>
               <a:buNone/>
               <a:tabLst/>
-              <a:defRPr sz="1800">
+              <a:defRPr sz="2400">
                 <a:solidFill>
                   <a:schemeClr val="tx1"/>
                 </a:solidFill>
@@ -2173,7 +2161,7 @@
             </a:lvl1pPr>
             <a:lvl2pPr marL="685800" marR="0" indent="-228600" algn="l" defTabSz="914400" rtl="0" eaLnBrk="1" fontAlgn="auto" latinLnBrk="0" hangingPunct="1">
               <a:lnSpc>
-                <a:spcPct val="90000"/>
+                <a:spcPct val="150000"/>
               </a:lnSpc>
               <a:spcBef>
                 <a:spcPts val="500"/>
@@ -2186,7 +2174,7 @@
               <a:buFont typeface="Arial" panose="020B0604020202020204" pitchFamily="34" charset="0"/>
               <a:buChar char="•"/>
               <a:tabLst/>
-              <a:defRPr sz="1800">
+              <a:defRPr sz="2400">
                 <a:solidFill>
                   <a:schemeClr val="tx1"/>
                 </a:solidFill>
@@ -2195,7 +2183,7 @@
             </a:lvl2pPr>
             <a:lvl3pPr marL="1143000" marR="0" indent="-228600" algn="l" defTabSz="914400" rtl="0" eaLnBrk="1" fontAlgn="auto" latinLnBrk="0" hangingPunct="1">
               <a:lnSpc>
-                <a:spcPct val="90000"/>
+                <a:spcPct val="150000"/>
               </a:lnSpc>
               <a:spcBef>
                 <a:spcPts val="500"/>
@@ -2208,7 +2196,7 @@
               <a:buFont typeface="Arial" panose="020B0604020202020204" pitchFamily="34" charset="0"/>
               <a:buChar char="•"/>
               <a:tabLst/>
-              <a:defRPr sz="1800">
+              <a:defRPr sz="2400">
                 <a:solidFill>
                   <a:schemeClr val="tx1"/>
                 </a:solidFill>
@@ -2217,7 +2205,7 @@
             </a:lvl3pPr>
             <a:lvl4pPr marL="1600200" marR="0" indent="-228600" algn="l" defTabSz="914400" rtl="0" eaLnBrk="1" fontAlgn="auto" latinLnBrk="0" hangingPunct="1">
               <a:lnSpc>
-                <a:spcPct val="90000"/>
+                <a:spcPct val="150000"/>
               </a:lnSpc>
               <a:spcBef>
                 <a:spcPts val="500"/>
@@ -2230,7 +2218,7 @@
               <a:buFont typeface="Arial" panose="020B0604020202020204" pitchFamily="34" charset="0"/>
               <a:buChar char="•"/>
               <a:tabLst/>
-              <a:defRPr sz="1800">
+              <a:defRPr sz="2400">
                 <a:solidFill>
                   <a:schemeClr val="tx1"/>
                 </a:solidFill>
@@ -2239,7 +2227,7 @@
             </a:lvl4pPr>
             <a:lvl5pPr marL="2057400" marR="0" indent="-228600" algn="l" defTabSz="914400" rtl="0" eaLnBrk="1" fontAlgn="auto" latinLnBrk="0" hangingPunct="1">
               <a:lnSpc>
-                <a:spcPct val="90000"/>
+                <a:spcPct val="150000"/>
               </a:lnSpc>
               <a:spcBef>
                 <a:spcPts val="500"/>
@@ -2252,7 +2240,7 @@
               <a:buFont typeface="Arial" panose="020B0604020202020204" pitchFamily="34" charset="0"/>
               <a:buChar char="•"/>
               <a:tabLst/>
-              <a:defRPr sz="1800">
+              <a:defRPr sz="2400">
                 <a:solidFill>
                   <a:schemeClr val="tx1"/>
                 </a:solidFill>
@@ -2294,10 +2282,6 @@
               <a:rPr lang="en-US" dirty="0" err="1" smtClean="0"/>
               <a:t>texte</a:t>
             </a:r>
-            <a:endParaRPr lang="en-US" dirty="0" smtClean="0"/>
-          </a:p>
-          <a:p>
-            <a:pPr lvl="0"/>
             <a:endParaRPr lang="en-US" dirty="0" smtClean="0"/>
           </a:p>
           <a:p>
@@ -2553,7 +2537,7 @@
           </a:bodyPr>
           <a:lstStyle>
             <a:lvl1pPr>
-              <a:defRPr sz="2400" b="1" baseline="0">
+              <a:defRPr sz="2800" b="1" baseline="0">
                 <a:solidFill>
                   <a:schemeClr val="tx1"/>
                 </a:solidFill>
@@ -2626,7 +2610,7 @@
               <a:buFont typeface="Arial" panose="020B0604020202020204" pitchFamily="34" charset="0"/>
               <a:buNone/>
               <a:tabLst/>
-              <a:defRPr sz="1800">
+              <a:defRPr sz="2400">
                 <a:solidFill>
                   <a:schemeClr val="tx1"/>
                 </a:solidFill>
@@ -2648,7 +2632,7 @@
               <a:buFont typeface="Arial" panose="020B0604020202020204" pitchFamily="34" charset="0"/>
               <a:buChar char="•"/>
               <a:tabLst/>
-              <a:defRPr sz="1800">
+              <a:defRPr sz="2400">
                 <a:solidFill>
                   <a:schemeClr val="tx1"/>
                 </a:solidFill>
@@ -2670,7 +2654,7 @@
               <a:buFont typeface="Arial" panose="020B0604020202020204" pitchFamily="34" charset="0"/>
               <a:buChar char="•"/>
               <a:tabLst/>
-              <a:defRPr sz="1800">
+              <a:defRPr sz="2400">
                 <a:solidFill>
                   <a:schemeClr val="tx1"/>
                 </a:solidFill>
@@ -2692,7 +2676,7 @@
               <a:buFont typeface="Arial" panose="020B0604020202020204" pitchFamily="34" charset="0"/>
               <a:buChar char="•"/>
               <a:tabLst/>
-              <a:defRPr sz="1800">
+              <a:defRPr sz="2400">
                 <a:solidFill>
                   <a:schemeClr val="tx1"/>
                 </a:solidFill>
@@ -2714,7 +2698,7 @@
               <a:buFont typeface="Arial" panose="020B0604020202020204" pitchFamily="34" charset="0"/>
               <a:buChar char="•"/>
               <a:tabLst/>
-              <a:defRPr sz="1800">
+              <a:defRPr sz="2400">
                 <a:solidFill>
                   <a:schemeClr val="tx1"/>
                 </a:solidFill>
@@ -2756,10 +2740,6 @@
               <a:rPr lang="en-US" dirty="0" err="1" smtClean="0"/>
               <a:t>texte</a:t>
             </a:r>
-            <a:endParaRPr lang="en-US" dirty="0" smtClean="0"/>
-          </a:p>
-          <a:p>
-            <a:pPr lvl="0"/>
             <a:endParaRPr lang="en-US" dirty="0" smtClean="0"/>
           </a:p>
           <a:p>
@@ -3082,11 +3062,13 @@
           </a:xfrm>
         </p:spPr>
         <p:txBody>
-          <a:bodyPr anchor="ctr"/>
+          <a:bodyPr anchor="ctr">
+            <a:normAutofit/>
+          </a:bodyPr>
           <a:lstStyle>
             <a:lvl1pPr marL="0" indent="0" algn="ctr">
               <a:buNone/>
-              <a:defRPr baseline="0"/>
+              <a:defRPr sz="2400" baseline="0"/>
             </a:lvl1pPr>
           </a:lstStyle>
           <a:p>
@@ -3177,11 +3159,13 @@
           </a:solidFill>
         </p:spPr>
         <p:txBody>
-          <a:bodyPr anchor="ctr"/>
+          <a:bodyPr anchor="ctr">
+            <a:normAutofit/>
+          </a:bodyPr>
           <a:lstStyle>
             <a:lvl1pPr marL="0" indent="0" algn="ctr">
               <a:buNone/>
-              <a:defRPr baseline="0">
+              <a:defRPr sz="2400" baseline="0">
                 <a:solidFill>
                   <a:schemeClr val="bg1"/>
                 </a:solidFill>
@@ -4244,7 +4228,7 @@
 
 <file path=ppt/tags/tag1.xml><?xml version="1.0" encoding="utf-8"?>
 <p:tagLst xmlns:a="http://schemas.openxmlformats.org/drawingml/2006/main" xmlns:r="http://schemas.openxmlformats.org/officeDocument/2006/relationships" xmlns:p="http://schemas.openxmlformats.org/presentationml/2006/main">
-  <p:tag name="ENGAGE" val="{&quot;SavedSwatch&quot;:&quot;-16747630|-1615358|-5828210|-11231456|-12763591|Shared Services Canada&quot;,&quot;Id&quot;:&quot;5d77a61d43314327a4d51943&quot;,&quot;SmartGridHorizontal&quot;:0,&quot;LinkedExcelSources&quot;:{},&quot;LinkedProjectSources&quot;:{},&quot;FlowConfig&quot;:{&quot;Canvas&quot;:{&quot;Slide&quot;:-1,&quot;Width&quot;:0,&quot;Height&quot;:0},&quot;Timeline&quot;:{&quot;Actions&quot;:[]}},&quot;LinkedSlideMergeSources&quot;:{},&quot;LinkedSharePointSlideMergeSources&quot;:{}}"/>
+  <p:tag name="ENGAGE" val="{&quot;SavedSwatch&quot;:&quot;-16747630|-1615358|-5828210|-11231456|-12763591|Shared Services Canada&quot;,&quot;Id&quot;:&quot;5dada49343314322844e8e2a&quot;,&quot;SmartGridHorizontal&quot;:0,&quot;LinkedExcelSources&quot;:{},&quot;LinkedProjectSources&quot;:{},&quot;FlowConfig&quot;:{&quot;Canvas&quot;:{&quot;Slide&quot;:-1,&quot;Width&quot;:0,&quot;Height&quot;:0},&quot;Timeline&quot;:{&quot;Actions&quot;:[]}},&quot;LinkedSlideMergeSources&quot;:{},&quot;LinkedSharePointSlideMergeSources&quot;:{}}"/>
 </p:tagLst>
 </file>
 

</xml_diff>